<commit_message>
Link of prototype video added
</commit_message>
<xml_diff>
--- a/EXCEPTION HANDLERS/EXCEPTION HANDLERS.pptx
+++ b/EXCEPTION HANDLERS/EXCEPTION HANDLERS.pptx
@@ -5,24 +5,26 @@
     <p:sldMasterId id="2147483659" r:id="rId1"/>
   </p:sldMasterIdLst>
   <p:notesMasterIdLst>
-    <p:notesMasterId r:id="rId17"/>
+    <p:notesMasterId r:id="rId19"/>
   </p:notesMasterIdLst>
   <p:sldIdLst>
     <p:sldId id="256" r:id="rId2"/>
     <p:sldId id="257" r:id="rId3"/>
     <p:sldId id="258" r:id="rId4"/>
-    <p:sldId id="259" r:id="rId5"/>
-    <p:sldId id="260" r:id="rId6"/>
-    <p:sldId id="261" r:id="rId7"/>
-    <p:sldId id="262" r:id="rId8"/>
-    <p:sldId id="263" r:id="rId9"/>
-    <p:sldId id="264" r:id="rId10"/>
-    <p:sldId id="265" r:id="rId11"/>
-    <p:sldId id="266" r:id="rId12"/>
-    <p:sldId id="267" r:id="rId13"/>
-    <p:sldId id="268" r:id="rId14"/>
-    <p:sldId id="269" r:id="rId15"/>
-    <p:sldId id="270" r:id="rId16"/>
+    <p:sldId id="273" r:id="rId5"/>
+    <p:sldId id="259" r:id="rId6"/>
+    <p:sldId id="260" r:id="rId7"/>
+    <p:sldId id="261" r:id="rId8"/>
+    <p:sldId id="262" r:id="rId9"/>
+    <p:sldId id="263" r:id="rId10"/>
+    <p:sldId id="264" r:id="rId11"/>
+    <p:sldId id="265" r:id="rId12"/>
+    <p:sldId id="266" r:id="rId13"/>
+    <p:sldId id="267" r:id="rId14"/>
+    <p:sldId id="268" r:id="rId15"/>
+    <p:sldId id="269" r:id="rId16"/>
+    <p:sldId id="271" r:id="rId17"/>
+    <p:sldId id="270" r:id="rId18"/>
   </p:sldIdLst>
   <p:sldSz cx="9144000" cy="5143500" type="screen16x9"/>
   <p:notesSz cx="6858000" cy="9144000"/>
@@ -257,7 +259,7 @@
   </p:defaultTextStyle>
   <p:extLst>
     <p:ext uri="{EFAFB233-063F-42B5-8137-9DF3F51BA10A}">
-      <p15:sldGuideLst xmlns:ahyp="http://schemas.microsoft.com/office/drawing/2018/hyperlinkcolor" xmlns:p15="http://schemas.microsoft.com/office/powerpoint/2012/main" xmlns:p14="http://schemas.microsoft.com/office/powerpoint/2010/main" xmlns:com="http://schemas.openxmlformats.org/drawingml/2006/compatibility" xmlns:pvml="urn:schemas-microsoft-com:office:powerpoint" xmlns:v="urn:schemas-microsoft-com:vml" xmlns:o="urn:schemas-microsoft-com:office:office" xmlns:dgm="http://schemas.openxmlformats.org/drawingml/2006/diagram" xmlns:c="http://schemas.openxmlformats.org/drawingml/2006/chart" xmlns:mv="urn:schemas-microsoft-com:mac:vml" xmlns:mc="http://schemas.openxmlformats.org/markup-compatibility/2006" xmlns="">
+      <p15:sldGuideLst xmlns="" xmlns:mc="http://schemas.openxmlformats.org/markup-compatibility/2006" xmlns:mv="urn:schemas-microsoft-com:mac:vml" xmlns:c="http://schemas.openxmlformats.org/drawingml/2006/chart" xmlns:dgm="http://schemas.openxmlformats.org/drawingml/2006/diagram" xmlns:o="urn:schemas-microsoft-com:office:office" xmlns:v="urn:schemas-microsoft-com:vml" xmlns:pvml="urn:schemas-microsoft-com:office:powerpoint" xmlns:com="http://schemas.openxmlformats.org/drawingml/2006/compatibility" xmlns:p14="http://schemas.microsoft.com/office/powerpoint/2010/main" xmlns:p15="http://schemas.microsoft.com/office/powerpoint/2012/main" xmlns:ahyp="http://schemas.microsoft.com/office/drawing/2018/hyperlinkcolor">
         <p15:guide id="1" orient="horz" pos="1620">
           <p15:clr>
             <a:srgbClr val="A4A3A4"/>
@@ -7497,6 +7499,531 @@
   <p:cSld>
     <p:spTree>
       <p:nvGrpSpPr>
+        <p:cNvPr id="1" name="Shape 116"/>
+        <p:cNvGrpSpPr/>
+        <p:nvPr/>
+      </p:nvGrpSpPr>
+      <p:grpSpPr>
+        <a:xfrm>
+          <a:off x="0" y="0"/>
+          <a:ext cx="0" cy="0"/>
+          <a:chOff x="0" y="0"/>
+          <a:chExt cx="0" cy="0"/>
+        </a:xfrm>
+      </p:grpSpPr>
+      <p:sp>
+        <p:nvSpPr>
+          <p:cNvPr id="117" name="Google Shape;117;p21"/>
+          <p:cNvSpPr txBox="1">
+            <a:spLocks noGrp="1"/>
+          </p:cNvSpPr>
+          <p:nvPr>
+            <p:ph type="title"/>
+          </p:nvPr>
+        </p:nvSpPr>
+        <p:spPr>
+          <a:xfrm>
+            <a:off x="311700" y="445025"/>
+            <a:ext cx="8520600" cy="572700"/>
+          </a:xfrm>
+          <a:prstGeom prst="rect">
+            <a:avLst/>
+          </a:prstGeom>
+        </p:spPr>
+        <p:txBody>
+          <a:bodyPr spcFirstLastPara="1" wrap="square" lIns="91425" tIns="91425" rIns="91425" bIns="91425" anchor="t" anchorCtr="0">
+            <a:normAutofit fontScale="90000"/>
+          </a:bodyPr>
+          <a:lstStyle/>
+          <a:p>
+            <a:pPr marL="0" lvl="0" indent="0" algn="l" rtl="0">
+              <a:spcBef>
+                <a:spcPts val="0"/>
+              </a:spcBef>
+              <a:spcAft>
+                <a:spcPts val="0"/>
+              </a:spcAft>
+              <a:buNone/>
+            </a:pPr>
+            <a:r>
+              <a:rPr lang="en"/>
+              <a:t>GROWTH TRACKER</a:t>
+            </a:r>
+            <a:endParaRPr/>
+          </a:p>
+        </p:txBody>
+      </p:sp>
+      <p:sp>
+        <p:nvSpPr>
+          <p:cNvPr id="118" name="Google Shape;118;p21"/>
+          <p:cNvSpPr txBox="1">
+            <a:spLocks noGrp="1"/>
+          </p:cNvSpPr>
+          <p:nvPr>
+            <p:ph type="body" idx="1"/>
+          </p:nvPr>
+        </p:nvSpPr>
+        <p:spPr>
+          <a:xfrm>
+            <a:off x="311700" y="863550"/>
+            <a:ext cx="8520600" cy="3416400"/>
+          </a:xfrm>
+          <a:prstGeom prst="rect">
+            <a:avLst/>
+          </a:prstGeom>
+        </p:spPr>
+        <p:txBody>
+          <a:bodyPr spcFirstLastPara="1" wrap="square" lIns="91425" tIns="91425" rIns="91425" bIns="91425" anchor="t" anchorCtr="0">
+            <a:normAutofit/>
+          </a:bodyPr>
+          <a:lstStyle/>
+          <a:p>
+            <a:pPr marL="0" lvl="0" indent="0" algn="l" rtl="0">
+              <a:spcBef>
+                <a:spcPts val="0"/>
+              </a:spcBef>
+              <a:spcAft>
+                <a:spcPts val="1200"/>
+              </a:spcAft>
+              <a:buNone/>
+            </a:pPr>
+            <a:r>
+              <a:rPr lang="en">
+                <a:solidFill>
+                  <a:srgbClr val="00FFFF"/>
+                </a:solidFill>
+              </a:rPr>
+              <a:t>Helps to identify your kid’s health status- underweight,overweight or normal weight</a:t>
+            </a:r>
+            <a:endParaRPr>
+              <a:solidFill>
+                <a:srgbClr val="00FFFF"/>
+              </a:solidFill>
+            </a:endParaRPr>
+          </a:p>
+        </p:txBody>
+      </p:sp>
+      <p:sp>
+        <p:nvSpPr>
+          <p:cNvPr id="119" name="Google Shape;119;p21"/>
+          <p:cNvSpPr/>
+          <p:nvPr/>
+        </p:nvSpPr>
+        <p:spPr>
+          <a:xfrm>
+            <a:off x="1945850" y="1648400"/>
+            <a:ext cx="2342400" cy="2007900"/>
+          </a:xfrm>
+          <a:prstGeom prst="roundRect">
+            <a:avLst>
+              <a:gd name="adj" fmla="val 16667"/>
+            </a:avLst>
+          </a:prstGeom>
+          <a:solidFill>
+            <a:srgbClr val="6AA84F"/>
+          </a:solidFill>
+          <a:ln w="9525" cap="flat" cmpd="sng">
+            <a:solidFill>
+              <a:schemeClr val="dk2"/>
+            </a:solidFill>
+            <a:prstDash val="solid"/>
+            <a:round/>
+            <a:headEnd type="none" w="sm" len="sm"/>
+            <a:tailEnd type="none" w="sm" len="sm"/>
+          </a:ln>
+        </p:spPr>
+        <p:txBody>
+          <a:bodyPr spcFirstLastPara="1" wrap="square" lIns="91425" tIns="91425" rIns="91425" bIns="91425" anchor="ctr" anchorCtr="0">
+            <a:noAutofit/>
+          </a:bodyPr>
+          <a:lstStyle/>
+          <a:p>
+            <a:pPr marL="0" lvl="0" indent="0" algn="l" rtl="0">
+              <a:spcBef>
+                <a:spcPts val="0"/>
+              </a:spcBef>
+              <a:spcAft>
+                <a:spcPts val="0"/>
+              </a:spcAft>
+              <a:buNone/>
+            </a:pPr>
+            <a:endParaRPr/>
+          </a:p>
+        </p:txBody>
+      </p:sp>
+      <p:sp>
+        <p:nvSpPr>
+          <p:cNvPr id="120" name="Google Shape;120;p21"/>
+          <p:cNvSpPr txBox="1"/>
+          <p:nvPr/>
+        </p:nvSpPr>
+        <p:spPr>
+          <a:xfrm>
+            <a:off x="2268100" y="2217025"/>
+            <a:ext cx="1933500" cy="769500"/>
+          </a:xfrm>
+          <a:prstGeom prst="rect">
+            <a:avLst/>
+          </a:prstGeom>
+          <a:noFill/>
+          <a:ln>
+            <a:noFill/>
+          </a:ln>
+        </p:spPr>
+        <p:txBody>
+          <a:bodyPr spcFirstLastPara="1" wrap="square" lIns="91425" tIns="91425" rIns="91425" bIns="91425" anchor="t" anchorCtr="0">
+            <a:spAutoFit/>
+          </a:bodyPr>
+          <a:lstStyle/>
+          <a:p>
+            <a:pPr marL="0" lvl="0" indent="0" algn="l" rtl="0">
+              <a:spcBef>
+                <a:spcPts val="0"/>
+              </a:spcBef>
+              <a:spcAft>
+                <a:spcPts val="0"/>
+              </a:spcAft>
+              <a:buNone/>
+            </a:pPr>
+            <a:r>
+              <a:rPr lang="en" sz="1900"/>
+              <a:t>BMI CALCULATOR</a:t>
+            </a:r>
+            <a:endParaRPr sz="1900"/>
+          </a:p>
+        </p:txBody>
+      </p:sp>
+      <p:cxnSp>
+        <p:nvCxnSpPr>
+          <p:cNvPr id="121" name="Google Shape;121;p21"/>
+          <p:cNvCxnSpPr/>
+          <p:nvPr/>
+        </p:nvCxnSpPr>
+        <p:spPr>
+          <a:xfrm rot="10800000" flipH="1">
+            <a:off x="805550" y="2020125"/>
+            <a:ext cx="1140300" cy="24900"/>
+          </a:xfrm>
+          <a:prstGeom prst="straightConnector1">
+            <a:avLst/>
+          </a:prstGeom>
+          <a:noFill/>
+          <a:ln w="38100" cap="flat" cmpd="sng">
+            <a:solidFill>
+              <a:srgbClr val="1155CC"/>
+            </a:solidFill>
+            <a:prstDash val="solid"/>
+            <a:round/>
+            <a:headEnd type="none" w="med" len="med"/>
+            <a:tailEnd type="triangle" w="med" len="med"/>
+          </a:ln>
+        </p:spPr>
+      </p:cxnSp>
+      <p:cxnSp>
+        <p:nvCxnSpPr>
+          <p:cNvPr id="122" name="Google Shape;122;p21"/>
+          <p:cNvCxnSpPr/>
+          <p:nvPr/>
+        </p:nvCxnSpPr>
+        <p:spPr>
+          <a:xfrm>
+            <a:off x="855175" y="3098500"/>
+            <a:ext cx="991500" cy="0"/>
+          </a:xfrm>
+          <a:prstGeom prst="straightConnector1">
+            <a:avLst/>
+          </a:prstGeom>
+          <a:noFill/>
+          <a:ln w="38100" cap="flat" cmpd="sng">
+            <a:solidFill>
+              <a:srgbClr val="1155CC"/>
+            </a:solidFill>
+            <a:prstDash val="solid"/>
+            <a:round/>
+            <a:headEnd type="none" w="med" len="med"/>
+            <a:tailEnd type="triangle" w="med" len="med"/>
+          </a:ln>
+        </p:spPr>
+      </p:cxnSp>
+      <p:sp>
+        <p:nvSpPr>
+          <p:cNvPr id="123" name="Google Shape;123;p21"/>
+          <p:cNvSpPr txBox="1"/>
+          <p:nvPr/>
+        </p:nvSpPr>
+        <p:spPr>
+          <a:xfrm>
+            <a:off x="904750" y="1697975"/>
+            <a:ext cx="768300" cy="400200"/>
+          </a:xfrm>
+          <a:prstGeom prst="rect">
+            <a:avLst/>
+          </a:prstGeom>
+          <a:noFill/>
+          <a:ln>
+            <a:noFill/>
+          </a:ln>
+        </p:spPr>
+        <p:txBody>
+          <a:bodyPr spcFirstLastPara="1" wrap="square" lIns="91425" tIns="91425" rIns="91425" bIns="91425" anchor="t" anchorCtr="0">
+            <a:spAutoFit/>
+          </a:bodyPr>
+          <a:lstStyle/>
+          <a:p>
+            <a:pPr marL="0" lvl="0" indent="0" algn="l" rtl="0">
+              <a:spcBef>
+                <a:spcPts val="0"/>
+              </a:spcBef>
+              <a:spcAft>
+                <a:spcPts val="0"/>
+              </a:spcAft>
+              <a:buNone/>
+            </a:pPr>
+            <a:r>
+              <a:rPr lang="en">
+                <a:solidFill>
+                  <a:srgbClr val="FF00FF"/>
+                </a:solidFill>
+              </a:rPr>
+              <a:t>Height</a:t>
+            </a:r>
+            <a:endParaRPr>
+              <a:solidFill>
+                <a:srgbClr val="FF00FF"/>
+              </a:solidFill>
+            </a:endParaRPr>
+          </a:p>
+        </p:txBody>
+      </p:sp>
+      <p:sp>
+        <p:nvSpPr>
+          <p:cNvPr id="124" name="Google Shape;124;p21"/>
+          <p:cNvSpPr txBox="1"/>
+          <p:nvPr/>
+        </p:nvSpPr>
+        <p:spPr>
+          <a:xfrm>
+            <a:off x="941950" y="3098500"/>
+            <a:ext cx="904800" cy="400200"/>
+          </a:xfrm>
+          <a:prstGeom prst="rect">
+            <a:avLst/>
+          </a:prstGeom>
+          <a:noFill/>
+          <a:ln>
+            <a:noFill/>
+          </a:ln>
+        </p:spPr>
+        <p:txBody>
+          <a:bodyPr spcFirstLastPara="1" wrap="square" lIns="91425" tIns="91425" rIns="91425" bIns="91425" anchor="t" anchorCtr="0">
+            <a:spAutoFit/>
+          </a:bodyPr>
+          <a:lstStyle/>
+          <a:p>
+            <a:pPr marL="0" lvl="0" indent="0" algn="l" rtl="0">
+              <a:spcBef>
+                <a:spcPts val="0"/>
+              </a:spcBef>
+              <a:spcAft>
+                <a:spcPts val="0"/>
+              </a:spcAft>
+              <a:buNone/>
+            </a:pPr>
+            <a:r>
+              <a:rPr lang="en">
+                <a:solidFill>
+                  <a:srgbClr val="FF00FF"/>
+                </a:solidFill>
+              </a:rPr>
+              <a:t>Weight</a:t>
+            </a:r>
+            <a:endParaRPr>
+              <a:solidFill>
+                <a:srgbClr val="FF00FF"/>
+              </a:solidFill>
+            </a:endParaRPr>
+          </a:p>
+        </p:txBody>
+      </p:sp>
+      <p:cxnSp>
+        <p:nvCxnSpPr>
+          <p:cNvPr id="125" name="Google Shape;125;p21"/>
+          <p:cNvCxnSpPr/>
+          <p:nvPr/>
+        </p:nvCxnSpPr>
+        <p:spPr>
+          <a:xfrm rot="10800000" flipH="1">
+            <a:off x="4288250" y="2640050"/>
+            <a:ext cx="1338600" cy="12300"/>
+          </a:xfrm>
+          <a:prstGeom prst="straightConnector1">
+            <a:avLst/>
+          </a:prstGeom>
+          <a:noFill/>
+          <a:ln w="38100" cap="flat" cmpd="sng">
+            <a:solidFill>
+              <a:srgbClr val="0000FF"/>
+            </a:solidFill>
+            <a:prstDash val="solid"/>
+            <a:round/>
+            <a:headEnd type="none" w="med" len="med"/>
+            <a:tailEnd type="triangle" w="med" len="med"/>
+          </a:ln>
+        </p:spPr>
+      </p:cxnSp>
+      <p:sp>
+        <p:nvSpPr>
+          <p:cNvPr id="126" name="Google Shape;126;p21"/>
+          <p:cNvSpPr txBox="1"/>
+          <p:nvPr/>
+        </p:nvSpPr>
+        <p:spPr>
+          <a:xfrm>
+            <a:off x="4399850" y="2342450"/>
+            <a:ext cx="1078200" cy="400200"/>
+          </a:xfrm>
+          <a:prstGeom prst="rect">
+            <a:avLst/>
+          </a:prstGeom>
+          <a:noFill/>
+          <a:ln>
+            <a:noFill/>
+          </a:ln>
+        </p:spPr>
+        <p:txBody>
+          <a:bodyPr spcFirstLastPara="1" wrap="square" lIns="91425" tIns="91425" rIns="91425" bIns="91425" anchor="t" anchorCtr="0">
+            <a:spAutoFit/>
+          </a:bodyPr>
+          <a:lstStyle/>
+          <a:p>
+            <a:pPr marL="0" lvl="0" indent="0" algn="l" rtl="0">
+              <a:spcBef>
+                <a:spcPts val="0"/>
+              </a:spcBef>
+              <a:spcAft>
+                <a:spcPts val="0"/>
+              </a:spcAft>
+              <a:buNone/>
+            </a:pPr>
+            <a:r>
+              <a:rPr lang="en">
+                <a:solidFill>
+                  <a:srgbClr val="FF00FF"/>
+                </a:solidFill>
+              </a:rPr>
+              <a:t>Assess</a:t>
+            </a:r>
+            <a:endParaRPr>
+              <a:solidFill>
+                <a:srgbClr val="FF00FF"/>
+              </a:solidFill>
+            </a:endParaRPr>
+          </a:p>
+        </p:txBody>
+      </p:sp>
+      <p:sp>
+        <p:nvSpPr>
+          <p:cNvPr id="127" name="Google Shape;127;p21"/>
+          <p:cNvSpPr/>
+          <p:nvPr/>
+        </p:nvSpPr>
+        <p:spPr>
+          <a:xfrm>
+            <a:off x="5738400" y="1722775"/>
+            <a:ext cx="2516100" cy="1933500"/>
+          </a:xfrm>
+          <a:prstGeom prst="roundRect">
+            <a:avLst>
+              <a:gd name="adj" fmla="val 16667"/>
+            </a:avLst>
+          </a:prstGeom>
+          <a:solidFill>
+            <a:srgbClr val="6AA84F"/>
+          </a:solidFill>
+          <a:ln w="9525" cap="flat" cmpd="sng">
+            <a:solidFill>
+              <a:schemeClr val="dk2"/>
+            </a:solidFill>
+            <a:prstDash val="solid"/>
+            <a:round/>
+            <a:headEnd type="none" w="sm" len="sm"/>
+            <a:tailEnd type="none" w="sm" len="sm"/>
+          </a:ln>
+        </p:spPr>
+        <p:txBody>
+          <a:bodyPr spcFirstLastPara="1" wrap="square" lIns="91425" tIns="91425" rIns="91425" bIns="91425" anchor="ctr" anchorCtr="0">
+            <a:noAutofit/>
+          </a:bodyPr>
+          <a:lstStyle/>
+          <a:p>
+            <a:pPr marL="0" lvl="0" indent="0" algn="l" rtl="0">
+              <a:spcBef>
+                <a:spcPts val="0"/>
+              </a:spcBef>
+              <a:spcAft>
+                <a:spcPts val="0"/>
+              </a:spcAft>
+              <a:buNone/>
+            </a:pPr>
+            <a:endParaRPr/>
+          </a:p>
+        </p:txBody>
+      </p:sp>
+      <p:sp>
+        <p:nvSpPr>
+          <p:cNvPr id="128" name="Google Shape;128;p21"/>
+          <p:cNvSpPr txBox="1"/>
+          <p:nvPr/>
+        </p:nvSpPr>
+        <p:spPr>
+          <a:xfrm>
+            <a:off x="6135025" y="2082200"/>
+            <a:ext cx="2119500" cy="1046700"/>
+          </a:xfrm>
+          <a:prstGeom prst="rect">
+            <a:avLst/>
+          </a:prstGeom>
+          <a:noFill/>
+          <a:ln>
+            <a:noFill/>
+          </a:ln>
+        </p:spPr>
+        <p:txBody>
+          <a:bodyPr spcFirstLastPara="1" wrap="square" lIns="91425" tIns="91425" rIns="91425" bIns="91425" anchor="t" anchorCtr="0">
+            <a:spAutoFit/>
+          </a:bodyPr>
+          <a:lstStyle/>
+          <a:p>
+            <a:pPr marL="0" lvl="0" indent="0" algn="l" rtl="0">
+              <a:spcBef>
+                <a:spcPts val="0"/>
+              </a:spcBef>
+              <a:spcAft>
+                <a:spcPts val="0"/>
+              </a:spcAft>
+              <a:buNone/>
+            </a:pPr>
+            <a:r>
+              <a:rPr lang="en" b="1" i="1"/>
+              <a:t>WE WILL PROVIDE REPORTS AND PERSONALIZED RECOMMENDATIONS</a:t>
+            </a:r>
+            <a:endParaRPr b="1" i="1"/>
+          </a:p>
+        </p:txBody>
+      </p:sp>
+    </p:spTree>
+  </p:cSld>
+  <p:clrMapOvr>
+    <a:masterClrMapping/>
+  </p:clrMapOvr>
+</p:sld>
+</file>
+
+<file path=ppt/slides/slide11.xml><?xml version="1.0" encoding="utf-8"?>
+<p:sld xmlns:a="http://schemas.openxmlformats.org/drawingml/2006/main" xmlns:r="http://schemas.openxmlformats.org/officeDocument/2006/relationships" xmlns:p="http://schemas.openxmlformats.org/presentationml/2006/main">
+  <p:cSld>
+    <p:spTree>
+      <p:nvGrpSpPr>
         <p:cNvPr id="1" name="Shape 132"/>
         <p:cNvGrpSpPr/>
         <p:nvPr/>
@@ -7669,7 +8196,7 @@
 </p:sld>
 </file>
 
-<file path=ppt/slides/slide11.xml><?xml version="1.0" encoding="utf-8"?>
+<file path=ppt/slides/slide12.xml><?xml version="1.0" encoding="utf-8"?>
 <p:sld xmlns:a="http://schemas.openxmlformats.org/drawingml/2006/main" xmlns:r="http://schemas.openxmlformats.org/officeDocument/2006/relationships" xmlns:p="http://schemas.openxmlformats.org/presentationml/2006/main">
   <p:cSld>
     <p:spTree>
@@ -7868,7 +8395,7 @@
 </p:sld>
 </file>
 
-<file path=ppt/slides/slide12.xml><?xml version="1.0" encoding="utf-8"?>
+<file path=ppt/slides/slide13.xml><?xml version="1.0" encoding="utf-8"?>
 <p:sld xmlns:a="http://schemas.openxmlformats.org/drawingml/2006/main" xmlns:r="http://schemas.openxmlformats.org/officeDocument/2006/relationships" xmlns:p="http://schemas.openxmlformats.org/presentationml/2006/main">
   <p:cSld>
     <p:spTree>
@@ -8055,7 +8582,7 @@
 </p:sld>
 </file>
 
-<file path=ppt/slides/slide13.xml><?xml version="1.0" encoding="utf-8"?>
+<file path=ppt/slides/slide14.xml><?xml version="1.0" encoding="utf-8"?>
 <p:sld xmlns:a="http://schemas.openxmlformats.org/drawingml/2006/main" xmlns:r="http://schemas.openxmlformats.org/officeDocument/2006/relationships" xmlns:p="http://schemas.openxmlformats.org/presentationml/2006/main">
   <p:cSld>
     <p:spTree>
@@ -8280,7 +8807,7 @@
 </p:sld>
 </file>
 
-<file path=ppt/slides/slide14.xml><?xml version="1.0" encoding="utf-8"?>
+<file path=ppt/slides/slide15.xml><?xml version="1.0" encoding="utf-8"?>
 <p:sld xmlns:a="http://schemas.openxmlformats.org/drawingml/2006/main" xmlns:r="http://schemas.openxmlformats.org/officeDocument/2006/relationships" xmlns:p="http://schemas.openxmlformats.org/presentationml/2006/main">
   <p:cSld>
     <p:spTree>
@@ -8565,7 +9092,82 @@
 </p:sld>
 </file>
 
-<file path=ppt/slides/slide15.xml><?xml version="1.0" encoding="utf-8"?>
+<file path=ppt/slides/slide16.xml><?xml version="1.0" encoding="utf-8"?>
+<p:sld xmlns:a="http://schemas.openxmlformats.org/drawingml/2006/main" xmlns:r="http://schemas.openxmlformats.org/officeDocument/2006/relationships" xmlns:p="http://schemas.openxmlformats.org/presentationml/2006/main">
+  <p:cSld>
+    <p:spTree>
+      <p:nvGrpSpPr>
+        <p:cNvPr id="1" name=""/>
+        <p:cNvGrpSpPr/>
+        <p:nvPr/>
+      </p:nvGrpSpPr>
+      <p:grpSpPr>
+        <a:xfrm>
+          <a:off x="0" y="0"/>
+          <a:ext cx="0" cy="0"/>
+          <a:chOff x="0" y="0"/>
+          <a:chExt cx="0" cy="0"/>
+        </a:xfrm>
+      </p:grpSpPr>
+      <p:sp>
+        <p:nvSpPr>
+          <p:cNvPr id="2" name="Title 1"/>
+          <p:cNvSpPr>
+            <a:spLocks noGrp="1"/>
+          </p:cNvSpPr>
+          <p:nvPr>
+            <p:ph type="title"/>
+          </p:nvPr>
+        </p:nvSpPr>
+        <p:spPr/>
+        <p:txBody>
+          <a:bodyPr>
+            <a:normAutofit fontScale="90000"/>
+          </a:bodyPr>
+          <a:lstStyle/>
+          <a:p>
+            <a:r>
+              <a:rPr lang="en-IN" dirty="0" smtClean="0"/>
+              <a:t>LINK TO OUR PROTOTYPE VIDEO</a:t>
+            </a:r>
+            <a:endParaRPr lang="en-US" dirty="0"/>
+          </a:p>
+        </p:txBody>
+      </p:sp>
+      <p:sp>
+        <p:nvSpPr>
+          <p:cNvPr id="3" name="Text Placeholder 2"/>
+          <p:cNvSpPr>
+            <a:spLocks noGrp="1"/>
+          </p:cNvSpPr>
+          <p:nvPr>
+            <p:ph type="body" idx="1"/>
+          </p:nvPr>
+        </p:nvSpPr>
+        <p:spPr/>
+        <p:txBody>
+          <a:bodyPr/>
+          <a:lstStyle/>
+          <a:p>
+            <a:r>
+              <a:rPr lang="en-US" dirty="0" smtClean="0">
+                <a:hlinkClick r:id="rId2"/>
+              </a:rPr>
+              <a:t>https://drive.google.com/file/d/1jfU7cCAZRWTtZwUQdU-QdHGYeXqVxnNC/view?usp=sharing</a:t>
+            </a:r>
+            <a:endParaRPr lang="en-US" dirty="0"/>
+          </a:p>
+        </p:txBody>
+      </p:sp>
+    </p:spTree>
+  </p:cSld>
+  <p:clrMapOvr>
+    <a:masterClrMapping/>
+  </p:clrMapOvr>
+</p:sld>
+</file>
+
+<file path=ppt/slides/slide17.xml><?xml version="1.0" encoding="utf-8"?>
 <p:sld xmlns:a="http://schemas.openxmlformats.org/drawingml/2006/main" xmlns:r="http://schemas.openxmlformats.org/officeDocument/2006/relationships" xmlns:p="http://schemas.openxmlformats.org/presentationml/2006/main">
   <p:cSld>
     <p:spTree>
@@ -9550,6 +10152,81 @@
   <p:cSld>
     <p:spTree>
       <p:nvGrpSpPr>
+        <p:cNvPr id="1" name=""/>
+        <p:cNvGrpSpPr/>
+        <p:nvPr/>
+      </p:nvGrpSpPr>
+      <p:grpSpPr>
+        <a:xfrm>
+          <a:off x="0" y="0"/>
+          <a:ext cx="0" cy="0"/>
+          <a:chOff x="0" y="0"/>
+          <a:chExt cx="0" cy="0"/>
+        </a:xfrm>
+      </p:grpSpPr>
+      <p:sp>
+        <p:nvSpPr>
+          <p:cNvPr id="2" name="Title 1"/>
+          <p:cNvSpPr>
+            <a:spLocks noGrp="1"/>
+          </p:cNvSpPr>
+          <p:nvPr>
+            <p:ph type="title"/>
+          </p:nvPr>
+        </p:nvSpPr>
+        <p:spPr/>
+        <p:txBody>
+          <a:bodyPr>
+            <a:normAutofit fontScale="90000"/>
+          </a:bodyPr>
+          <a:lstStyle/>
+          <a:p>
+            <a:r>
+              <a:rPr lang="en-IN" dirty="0" smtClean="0"/>
+              <a:t>LINK TO OUR PROTOTYPE VIDEO</a:t>
+            </a:r>
+            <a:endParaRPr lang="en-US" dirty="0"/>
+          </a:p>
+        </p:txBody>
+      </p:sp>
+      <p:sp>
+        <p:nvSpPr>
+          <p:cNvPr id="3" name="Text Placeholder 2"/>
+          <p:cNvSpPr>
+            <a:spLocks noGrp="1"/>
+          </p:cNvSpPr>
+          <p:nvPr>
+            <p:ph type="body" idx="1"/>
+          </p:nvPr>
+        </p:nvSpPr>
+        <p:spPr/>
+        <p:txBody>
+          <a:bodyPr/>
+          <a:lstStyle/>
+          <a:p>
+            <a:r>
+              <a:rPr lang="en-US" dirty="0" smtClean="0">
+                <a:hlinkClick r:id="rId2"/>
+              </a:rPr>
+              <a:t>https://drive.google.com/file/d/1jfU7cCAZRWTtZwUQdU-QdHGYeXqVxnNC/view?usp=sharing</a:t>
+            </a:r>
+            <a:endParaRPr lang="en-US" dirty="0"/>
+          </a:p>
+        </p:txBody>
+      </p:sp>
+    </p:spTree>
+  </p:cSld>
+  <p:clrMapOvr>
+    <a:masterClrMapping/>
+  </p:clrMapOvr>
+</p:sld>
+</file>
+
+<file path=ppt/slides/slide5.xml><?xml version="1.0" encoding="utf-8"?>
+<p:sld xmlns:a="http://schemas.openxmlformats.org/drawingml/2006/main" xmlns:r="http://schemas.openxmlformats.org/officeDocument/2006/relationships" xmlns:p="http://schemas.openxmlformats.org/presentationml/2006/main">
+  <p:cSld>
+    <p:spTree>
+      <p:nvGrpSpPr>
         <p:cNvPr id="1" name="Shape 78"/>
         <p:cNvGrpSpPr/>
         <p:nvPr/>
@@ -9636,7 +10313,7 @@
 </p:sld>
 </file>
 
-<file path=ppt/slides/slide5.xml><?xml version="1.0" encoding="utf-8"?>
+<file path=ppt/slides/slide6.xml><?xml version="1.0" encoding="utf-8"?>
 <p:sld xmlns:a="http://schemas.openxmlformats.org/drawingml/2006/main" xmlns:r="http://schemas.openxmlformats.org/officeDocument/2006/relationships" xmlns:p="http://schemas.openxmlformats.org/presentationml/2006/main">
   <p:cSld>
     <p:spTree>
@@ -9975,7 +10652,7 @@
 </p:sld>
 </file>
 
-<file path=ppt/slides/slide6.xml><?xml version="1.0" encoding="utf-8"?>
+<file path=ppt/slides/slide7.xml><?xml version="1.0" encoding="utf-8"?>
 <p:sld xmlns:a="http://schemas.openxmlformats.org/drawingml/2006/main" xmlns:r="http://schemas.openxmlformats.org/officeDocument/2006/relationships" xmlns:p="http://schemas.openxmlformats.org/presentationml/2006/main">
   <p:cSld>
     <p:spTree>
@@ -10116,7 +10793,7 @@
 </p:sld>
 </file>
 
-<file path=ppt/slides/slide7.xml><?xml version="1.0" encoding="utf-8"?>
+<file path=ppt/slides/slide8.xml><?xml version="1.0" encoding="utf-8"?>
 <p:sld xmlns:a="http://schemas.openxmlformats.org/drawingml/2006/main" xmlns:r="http://schemas.openxmlformats.org/officeDocument/2006/relationships" xmlns:p="http://schemas.openxmlformats.org/presentationml/2006/main">
   <p:cSld>
     <p:spTree>
@@ -10215,7 +10892,7 @@
 </p:sld>
 </file>
 
-<file path=ppt/slides/slide8.xml><?xml version="1.0" encoding="utf-8"?>
+<file path=ppt/slides/slide9.xml><?xml version="1.0" encoding="utf-8"?>
 <p:sld xmlns:a="http://schemas.openxmlformats.org/drawingml/2006/main" xmlns:r="http://schemas.openxmlformats.org/officeDocument/2006/relationships" xmlns:p="http://schemas.openxmlformats.org/presentationml/2006/main">
   <p:cSld>
     <p:spTree>
@@ -10470,531 +11147,6 @@
           </a:ln>
         </p:spPr>
       </p:pic>
-    </p:spTree>
-  </p:cSld>
-  <p:clrMapOvr>
-    <a:masterClrMapping/>
-  </p:clrMapOvr>
-</p:sld>
-</file>
-
-<file path=ppt/slides/slide9.xml><?xml version="1.0" encoding="utf-8"?>
-<p:sld xmlns:a="http://schemas.openxmlformats.org/drawingml/2006/main" xmlns:r="http://schemas.openxmlformats.org/officeDocument/2006/relationships" xmlns:p="http://schemas.openxmlformats.org/presentationml/2006/main">
-  <p:cSld>
-    <p:spTree>
-      <p:nvGrpSpPr>
-        <p:cNvPr id="1" name="Shape 116"/>
-        <p:cNvGrpSpPr/>
-        <p:nvPr/>
-      </p:nvGrpSpPr>
-      <p:grpSpPr>
-        <a:xfrm>
-          <a:off x="0" y="0"/>
-          <a:ext cx="0" cy="0"/>
-          <a:chOff x="0" y="0"/>
-          <a:chExt cx="0" cy="0"/>
-        </a:xfrm>
-      </p:grpSpPr>
-      <p:sp>
-        <p:nvSpPr>
-          <p:cNvPr id="117" name="Google Shape;117;p21"/>
-          <p:cNvSpPr txBox="1">
-            <a:spLocks noGrp="1"/>
-          </p:cNvSpPr>
-          <p:nvPr>
-            <p:ph type="title"/>
-          </p:nvPr>
-        </p:nvSpPr>
-        <p:spPr>
-          <a:xfrm>
-            <a:off x="311700" y="445025"/>
-            <a:ext cx="8520600" cy="572700"/>
-          </a:xfrm>
-          <a:prstGeom prst="rect">
-            <a:avLst/>
-          </a:prstGeom>
-        </p:spPr>
-        <p:txBody>
-          <a:bodyPr spcFirstLastPara="1" wrap="square" lIns="91425" tIns="91425" rIns="91425" bIns="91425" anchor="t" anchorCtr="0">
-            <a:normAutofit fontScale="90000"/>
-          </a:bodyPr>
-          <a:lstStyle/>
-          <a:p>
-            <a:pPr marL="0" lvl="0" indent="0" algn="l" rtl="0">
-              <a:spcBef>
-                <a:spcPts val="0"/>
-              </a:spcBef>
-              <a:spcAft>
-                <a:spcPts val="0"/>
-              </a:spcAft>
-              <a:buNone/>
-            </a:pPr>
-            <a:r>
-              <a:rPr lang="en"/>
-              <a:t>GROWTH TRACKER</a:t>
-            </a:r>
-            <a:endParaRPr/>
-          </a:p>
-        </p:txBody>
-      </p:sp>
-      <p:sp>
-        <p:nvSpPr>
-          <p:cNvPr id="118" name="Google Shape;118;p21"/>
-          <p:cNvSpPr txBox="1">
-            <a:spLocks noGrp="1"/>
-          </p:cNvSpPr>
-          <p:nvPr>
-            <p:ph type="body" idx="1"/>
-          </p:nvPr>
-        </p:nvSpPr>
-        <p:spPr>
-          <a:xfrm>
-            <a:off x="311700" y="863550"/>
-            <a:ext cx="8520600" cy="3416400"/>
-          </a:xfrm>
-          <a:prstGeom prst="rect">
-            <a:avLst/>
-          </a:prstGeom>
-        </p:spPr>
-        <p:txBody>
-          <a:bodyPr spcFirstLastPara="1" wrap="square" lIns="91425" tIns="91425" rIns="91425" bIns="91425" anchor="t" anchorCtr="0">
-            <a:normAutofit/>
-          </a:bodyPr>
-          <a:lstStyle/>
-          <a:p>
-            <a:pPr marL="0" lvl="0" indent="0" algn="l" rtl="0">
-              <a:spcBef>
-                <a:spcPts val="0"/>
-              </a:spcBef>
-              <a:spcAft>
-                <a:spcPts val="1200"/>
-              </a:spcAft>
-              <a:buNone/>
-            </a:pPr>
-            <a:r>
-              <a:rPr lang="en">
-                <a:solidFill>
-                  <a:srgbClr val="00FFFF"/>
-                </a:solidFill>
-              </a:rPr>
-              <a:t>Helps to identify your kid’s health status- underweight,overweight or normal weight</a:t>
-            </a:r>
-            <a:endParaRPr>
-              <a:solidFill>
-                <a:srgbClr val="00FFFF"/>
-              </a:solidFill>
-            </a:endParaRPr>
-          </a:p>
-        </p:txBody>
-      </p:sp>
-      <p:sp>
-        <p:nvSpPr>
-          <p:cNvPr id="119" name="Google Shape;119;p21"/>
-          <p:cNvSpPr/>
-          <p:nvPr/>
-        </p:nvSpPr>
-        <p:spPr>
-          <a:xfrm>
-            <a:off x="1945850" y="1648400"/>
-            <a:ext cx="2342400" cy="2007900"/>
-          </a:xfrm>
-          <a:prstGeom prst="roundRect">
-            <a:avLst>
-              <a:gd name="adj" fmla="val 16667"/>
-            </a:avLst>
-          </a:prstGeom>
-          <a:solidFill>
-            <a:srgbClr val="6AA84F"/>
-          </a:solidFill>
-          <a:ln w="9525" cap="flat" cmpd="sng">
-            <a:solidFill>
-              <a:schemeClr val="dk2"/>
-            </a:solidFill>
-            <a:prstDash val="solid"/>
-            <a:round/>
-            <a:headEnd type="none" w="sm" len="sm"/>
-            <a:tailEnd type="none" w="sm" len="sm"/>
-          </a:ln>
-        </p:spPr>
-        <p:txBody>
-          <a:bodyPr spcFirstLastPara="1" wrap="square" lIns="91425" tIns="91425" rIns="91425" bIns="91425" anchor="ctr" anchorCtr="0">
-            <a:noAutofit/>
-          </a:bodyPr>
-          <a:lstStyle/>
-          <a:p>
-            <a:pPr marL="0" lvl="0" indent="0" algn="l" rtl="0">
-              <a:spcBef>
-                <a:spcPts val="0"/>
-              </a:spcBef>
-              <a:spcAft>
-                <a:spcPts val="0"/>
-              </a:spcAft>
-              <a:buNone/>
-            </a:pPr>
-            <a:endParaRPr/>
-          </a:p>
-        </p:txBody>
-      </p:sp>
-      <p:sp>
-        <p:nvSpPr>
-          <p:cNvPr id="120" name="Google Shape;120;p21"/>
-          <p:cNvSpPr txBox="1"/>
-          <p:nvPr/>
-        </p:nvSpPr>
-        <p:spPr>
-          <a:xfrm>
-            <a:off x="2268100" y="2217025"/>
-            <a:ext cx="1933500" cy="769500"/>
-          </a:xfrm>
-          <a:prstGeom prst="rect">
-            <a:avLst/>
-          </a:prstGeom>
-          <a:noFill/>
-          <a:ln>
-            <a:noFill/>
-          </a:ln>
-        </p:spPr>
-        <p:txBody>
-          <a:bodyPr spcFirstLastPara="1" wrap="square" lIns="91425" tIns="91425" rIns="91425" bIns="91425" anchor="t" anchorCtr="0">
-            <a:spAutoFit/>
-          </a:bodyPr>
-          <a:lstStyle/>
-          <a:p>
-            <a:pPr marL="0" lvl="0" indent="0" algn="l" rtl="0">
-              <a:spcBef>
-                <a:spcPts val="0"/>
-              </a:spcBef>
-              <a:spcAft>
-                <a:spcPts val="0"/>
-              </a:spcAft>
-              <a:buNone/>
-            </a:pPr>
-            <a:r>
-              <a:rPr lang="en" sz="1900"/>
-              <a:t>BMI CALCULATOR</a:t>
-            </a:r>
-            <a:endParaRPr sz="1900"/>
-          </a:p>
-        </p:txBody>
-      </p:sp>
-      <p:cxnSp>
-        <p:nvCxnSpPr>
-          <p:cNvPr id="121" name="Google Shape;121;p21"/>
-          <p:cNvCxnSpPr/>
-          <p:nvPr/>
-        </p:nvCxnSpPr>
-        <p:spPr>
-          <a:xfrm rot="10800000" flipH="1">
-            <a:off x="805550" y="2020125"/>
-            <a:ext cx="1140300" cy="24900"/>
-          </a:xfrm>
-          <a:prstGeom prst="straightConnector1">
-            <a:avLst/>
-          </a:prstGeom>
-          <a:noFill/>
-          <a:ln w="38100" cap="flat" cmpd="sng">
-            <a:solidFill>
-              <a:srgbClr val="1155CC"/>
-            </a:solidFill>
-            <a:prstDash val="solid"/>
-            <a:round/>
-            <a:headEnd type="none" w="med" len="med"/>
-            <a:tailEnd type="triangle" w="med" len="med"/>
-          </a:ln>
-        </p:spPr>
-      </p:cxnSp>
-      <p:cxnSp>
-        <p:nvCxnSpPr>
-          <p:cNvPr id="122" name="Google Shape;122;p21"/>
-          <p:cNvCxnSpPr/>
-          <p:nvPr/>
-        </p:nvCxnSpPr>
-        <p:spPr>
-          <a:xfrm>
-            <a:off x="855175" y="3098500"/>
-            <a:ext cx="991500" cy="0"/>
-          </a:xfrm>
-          <a:prstGeom prst="straightConnector1">
-            <a:avLst/>
-          </a:prstGeom>
-          <a:noFill/>
-          <a:ln w="38100" cap="flat" cmpd="sng">
-            <a:solidFill>
-              <a:srgbClr val="1155CC"/>
-            </a:solidFill>
-            <a:prstDash val="solid"/>
-            <a:round/>
-            <a:headEnd type="none" w="med" len="med"/>
-            <a:tailEnd type="triangle" w="med" len="med"/>
-          </a:ln>
-        </p:spPr>
-      </p:cxnSp>
-      <p:sp>
-        <p:nvSpPr>
-          <p:cNvPr id="123" name="Google Shape;123;p21"/>
-          <p:cNvSpPr txBox="1"/>
-          <p:nvPr/>
-        </p:nvSpPr>
-        <p:spPr>
-          <a:xfrm>
-            <a:off x="904750" y="1697975"/>
-            <a:ext cx="768300" cy="400200"/>
-          </a:xfrm>
-          <a:prstGeom prst="rect">
-            <a:avLst/>
-          </a:prstGeom>
-          <a:noFill/>
-          <a:ln>
-            <a:noFill/>
-          </a:ln>
-        </p:spPr>
-        <p:txBody>
-          <a:bodyPr spcFirstLastPara="1" wrap="square" lIns="91425" tIns="91425" rIns="91425" bIns="91425" anchor="t" anchorCtr="0">
-            <a:spAutoFit/>
-          </a:bodyPr>
-          <a:lstStyle/>
-          <a:p>
-            <a:pPr marL="0" lvl="0" indent="0" algn="l" rtl="0">
-              <a:spcBef>
-                <a:spcPts val="0"/>
-              </a:spcBef>
-              <a:spcAft>
-                <a:spcPts val="0"/>
-              </a:spcAft>
-              <a:buNone/>
-            </a:pPr>
-            <a:r>
-              <a:rPr lang="en">
-                <a:solidFill>
-                  <a:srgbClr val="FF00FF"/>
-                </a:solidFill>
-              </a:rPr>
-              <a:t>Height</a:t>
-            </a:r>
-            <a:endParaRPr>
-              <a:solidFill>
-                <a:srgbClr val="FF00FF"/>
-              </a:solidFill>
-            </a:endParaRPr>
-          </a:p>
-        </p:txBody>
-      </p:sp>
-      <p:sp>
-        <p:nvSpPr>
-          <p:cNvPr id="124" name="Google Shape;124;p21"/>
-          <p:cNvSpPr txBox="1"/>
-          <p:nvPr/>
-        </p:nvSpPr>
-        <p:spPr>
-          <a:xfrm>
-            <a:off x="941950" y="3098500"/>
-            <a:ext cx="904800" cy="400200"/>
-          </a:xfrm>
-          <a:prstGeom prst="rect">
-            <a:avLst/>
-          </a:prstGeom>
-          <a:noFill/>
-          <a:ln>
-            <a:noFill/>
-          </a:ln>
-        </p:spPr>
-        <p:txBody>
-          <a:bodyPr spcFirstLastPara="1" wrap="square" lIns="91425" tIns="91425" rIns="91425" bIns="91425" anchor="t" anchorCtr="0">
-            <a:spAutoFit/>
-          </a:bodyPr>
-          <a:lstStyle/>
-          <a:p>
-            <a:pPr marL="0" lvl="0" indent="0" algn="l" rtl="0">
-              <a:spcBef>
-                <a:spcPts val="0"/>
-              </a:spcBef>
-              <a:spcAft>
-                <a:spcPts val="0"/>
-              </a:spcAft>
-              <a:buNone/>
-            </a:pPr>
-            <a:r>
-              <a:rPr lang="en">
-                <a:solidFill>
-                  <a:srgbClr val="FF00FF"/>
-                </a:solidFill>
-              </a:rPr>
-              <a:t>Weight</a:t>
-            </a:r>
-            <a:endParaRPr>
-              <a:solidFill>
-                <a:srgbClr val="FF00FF"/>
-              </a:solidFill>
-            </a:endParaRPr>
-          </a:p>
-        </p:txBody>
-      </p:sp>
-      <p:cxnSp>
-        <p:nvCxnSpPr>
-          <p:cNvPr id="125" name="Google Shape;125;p21"/>
-          <p:cNvCxnSpPr/>
-          <p:nvPr/>
-        </p:nvCxnSpPr>
-        <p:spPr>
-          <a:xfrm rot="10800000" flipH="1">
-            <a:off x="4288250" y="2640050"/>
-            <a:ext cx="1338600" cy="12300"/>
-          </a:xfrm>
-          <a:prstGeom prst="straightConnector1">
-            <a:avLst/>
-          </a:prstGeom>
-          <a:noFill/>
-          <a:ln w="38100" cap="flat" cmpd="sng">
-            <a:solidFill>
-              <a:srgbClr val="0000FF"/>
-            </a:solidFill>
-            <a:prstDash val="solid"/>
-            <a:round/>
-            <a:headEnd type="none" w="med" len="med"/>
-            <a:tailEnd type="triangle" w="med" len="med"/>
-          </a:ln>
-        </p:spPr>
-      </p:cxnSp>
-      <p:sp>
-        <p:nvSpPr>
-          <p:cNvPr id="126" name="Google Shape;126;p21"/>
-          <p:cNvSpPr txBox="1"/>
-          <p:nvPr/>
-        </p:nvSpPr>
-        <p:spPr>
-          <a:xfrm>
-            <a:off x="4399850" y="2342450"/>
-            <a:ext cx="1078200" cy="400200"/>
-          </a:xfrm>
-          <a:prstGeom prst="rect">
-            <a:avLst/>
-          </a:prstGeom>
-          <a:noFill/>
-          <a:ln>
-            <a:noFill/>
-          </a:ln>
-        </p:spPr>
-        <p:txBody>
-          <a:bodyPr spcFirstLastPara="1" wrap="square" lIns="91425" tIns="91425" rIns="91425" bIns="91425" anchor="t" anchorCtr="0">
-            <a:spAutoFit/>
-          </a:bodyPr>
-          <a:lstStyle/>
-          <a:p>
-            <a:pPr marL="0" lvl="0" indent="0" algn="l" rtl="0">
-              <a:spcBef>
-                <a:spcPts val="0"/>
-              </a:spcBef>
-              <a:spcAft>
-                <a:spcPts val="0"/>
-              </a:spcAft>
-              <a:buNone/>
-            </a:pPr>
-            <a:r>
-              <a:rPr lang="en">
-                <a:solidFill>
-                  <a:srgbClr val="FF00FF"/>
-                </a:solidFill>
-              </a:rPr>
-              <a:t>Assess</a:t>
-            </a:r>
-            <a:endParaRPr>
-              <a:solidFill>
-                <a:srgbClr val="FF00FF"/>
-              </a:solidFill>
-            </a:endParaRPr>
-          </a:p>
-        </p:txBody>
-      </p:sp>
-      <p:sp>
-        <p:nvSpPr>
-          <p:cNvPr id="127" name="Google Shape;127;p21"/>
-          <p:cNvSpPr/>
-          <p:nvPr/>
-        </p:nvSpPr>
-        <p:spPr>
-          <a:xfrm>
-            <a:off x="5738400" y="1722775"/>
-            <a:ext cx="2516100" cy="1933500"/>
-          </a:xfrm>
-          <a:prstGeom prst="roundRect">
-            <a:avLst>
-              <a:gd name="adj" fmla="val 16667"/>
-            </a:avLst>
-          </a:prstGeom>
-          <a:solidFill>
-            <a:srgbClr val="6AA84F"/>
-          </a:solidFill>
-          <a:ln w="9525" cap="flat" cmpd="sng">
-            <a:solidFill>
-              <a:schemeClr val="dk2"/>
-            </a:solidFill>
-            <a:prstDash val="solid"/>
-            <a:round/>
-            <a:headEnd type="none" w="sm" len="sm"/>
-            <a:tailEnd type="none" w="sm" len="sm"/>
-          </a:ln>
-        </p:spPr>
-        <p:txBody>
-          <a:bodyPr spcFirstLastPara="1" wrap="square" lIns="91425" tIns="91425" rIns="91425" bIns="91425" anchor="ctr" anchorCtr="0">
-            <a:noAutofit/>
-          </a:bodyPr>
-          <a:lstStyle/>
-          <a:p>
-            <a:pPr marL="0" lvl="0" indent="0" algn="l" rtl="0">
-              <a:spcBef>
-                <a:spcPts val="0"/>
-              </a:spcBef>
-              <a:spcAft>
-                <a:spcPts val="0"/>
-              </a:spcAft>
-              <a:buNone/>
-            </a:pPr>
-            <a:endParaRPr/>
-          </a:p>
-        </p:txBody>
-      </p:sp>
-      <p:sp>
-        <p:nvSpPr>
-          <p:cNvPr id="128" name="Google Shape;128;p21"/>
-          <p:cNvSpPr txBox="1"/>
-          <p:nvPr/>
-        </p:nvSpPr>
-        <p:spPr>
-          <a:xfrm>
-            <a:off x="6135025" y="2082200"/>
-            <a:ext cx="2119500" cy="1046700"/>
-          </a:xfrm>
-          <a:prstGeom prst="rect">
-            <a:avLst/>
-          </a:prstGeom>
-          <a:noFill/>
-          <a:ln>
-            <a:noFill/>
-          </a:ln>
-        </p:spPr>
-        <p:txBody>
-          <a:bodyPr spcFirstLastPara="1" wrap="square" lIns="91425" tIns="91425" rIns="91425" bIns="91425" anchor="t" anchorCtr="0">
-            <a:spAutoFit/>
-          </a:bodyPr>
-          <a:lstStyle/>
-          <a:p>
-            <a:pPr marL="0" lvl="0" indent="0" algn="l" rtl="0">
-              <a:spcBef>
-                <a:spcPts val="0"/>
-              </a:spcBef>
-              <a:spcAft>
-                <a:spcPts val="0"/>
-              </a:spcAft>
-              <a:buNone/>
-            </a:pPr>
-            <a:r>
-              <a:rPr lang="en" b="1" i="1"/>
-              <a:t>WE WILL PROVIDE REPORTS AND PERSONALIZED RECOMMENDATIONS</a:t>
-            </a:r>
-            <a:endParaRPr b="1" i="1"/>
-          </a:p>
-        </p:txBody>
-      </p:sp>
     </p:spTree>
   </p:cSld>
   <p:clrMapOvr>

</xml_diff>